<commit_message>
Add docs about federation gateway
</commit_message>
<xml_diff>
--- a/docs/identityserver docs figures.pptx
+++ b/docs/identityserver docs figures.pptx
@@ -8,6 +8,7 @@
     <p:sldId id="256" r:id="rId2"/>
     <p:sldId id="257" r:id="rId3"/>
     <p:sldId id="258" r:id="rId4"/>
+    <p:sldId id="259" r:id="rId5"/>
   </p:sldIdLst>
   <p:sldSz cx="12192000" cy="6858000"/>
   <p:notesSz cx="6858000" cy="9144000"/>
@@ -106,6 +107,11 @@
       </a:defRPr>
     </a:lvl9pPr>
   </p:defaultTextStyle>
+  <p:extLst>
+    <p:ext uri="{EFAFB233-063F-42B5-8137-9DF3F51BA10A}">
+      <p15:sldGuideLst xmlns:p15="http://schemas.microsoft.com/office/powerpoint/2012/main"/>
+    </p:ext>
+  </p:extLst>
 </p:presentation>
 </file>
 
@@ -240,7 +246,7 @@
           <a:p>
             <a:fld id="{975CA606-A290-AA49-BB03-E46655C203C3}" type="datetimeFigureOut">
               <a:rPr lang="en-US" smtClean="0"/>
-              <a:t>3/19/17</a:t>
+              <a:t>4/3/17</a:t>
             </a:fld>
             <a:endParaRPr lang="en-US"/>
           </a:p>
@@ -410,7 +416,7 @@
           <a:p>
             <a:fld id="{975CA606-A290-AA49-BB03-E46655C203C3}" type="datetimeFigureOut">
               <a:rPr lang="en-US" smtClean="0"/>
-              <a:t>3/19/17</a:t>
+              <a:t>4/3/17</a:t>
             </a:fld>
             <a:endParaRPr lang="en-US"/>
           </a:p>
@@ -590,7 +596,7 @@
           <a:p>
             <a:fld id="{975CA606-A290-AA49-BB03-E46655C203C3}" type="datetimeFigureOut">
               <a:rPr lang="en-US" smtClean="0"/>
-              <a:t>3/19/17</a:t>
+              <a:t>4/3/17</a:t>
             </a:fld>
             <a:endParaRPr lang="en-US"/>
           </a:p>
@@ -760,7 +766,7 @@
           <a:p>
             <a:fld id="{975CA606-A290-AA49-BB03-E46655C203C3}" type="datetimeFigureOut">
               <a:rPr lang="en-US" smtClean="0"/>
-              <a:t>3/19/17</a:t>
+              <a:t>4/3/17</a:t>
             </a:fld>
             <a:endParaRPr lang="en-US"/>
           </a:p>
@@ -1006,7 +1012,7 @@
           <a:p>
             <a:fld id="{975CA606-A290-AA49-BB03-E46655C203C3}" type="datetimeFigureOut">
               <a:rPr lang="en-US" smtClean="0"/>
-              <a:t>3/19/17</a:t>
+              <a:t>4/3/17</a:t>
             </a:fld>
             <a:endParaRPr lang="en-US"/>
           </a:p>
@@ -1238,7 +1244,7 @@
           <a:p>
             <a:fld id="{975CA606-A290-AA49-BB03-E46655C203C3}" type="datetimeFigureOut">
               <a:rPr lang="en-US" smtClean="0"/>
-              <a:t>3/19/17</a:t>
+              <a:t>4/3/17</a:t>
             </a:fld>
             <a:endParaRPr lang="en-US"/>
           </a:p>
@@ -1605,7 +1611,7 @@
           <a:p>
             <a:fld id="{975CA606-A290-AA49-BB03-E46655C203C3}" type="datetimeFigureOut">
               <a:rPr lang="en-US" smtClean="0"/>
-              <a:t>3/19/17</a:t>
+              <a:t>4/3/17</a:t>
             </a:fld>
             <a:endParaRPr lang="en-US"/>
           </a:p>
@@ -1723,7 +1729,7 @@
           <a:p>
             <a:fld id="{975CA606-A290-AA49-BB03-E46655C203C3}" type="datetimeFigureOut">
               <a:rPr lang="en-US" smtClean="0"/>
-              <a:t>3/19/17</a:t>
+              <a:t>4/3/17</a:t>
             </a:fld>
             <a:endParaRPr lang="en-US"/>
           </a:p>
@@ -1818,7 +1824,7 @@
           <a:p>
             <a:fld id="{975CA606-A290-AA49-BB03-E46655C203C3}" type="datetimeFigureOut">
               <a:rPr lang="en-US" smtClean="0"/>
-              <a:t>3/19/17</a:t>
+              <a:t>4/3/17</a:t>
             </a:fld>
             <a:endParaRPr lang="en-US"/>
           </a:p>
@@ -2095,7 +2101,7 @@
           <a:p>
             <a:fld id="{975CA606-A290-AA49-BB03-E46655C203C3}" type="datetimeFigureOut">
               <a:rPr lang="en-US" smtClean="0"/>
-              <a:t>3/19/17</a:t>
+              <a:t>4/3/17</a:t>
             </a:fld>
             <a:endParaRPr lang="en-US"/>
           </a:p>
@@ -2348,7 +2354,7 @@
           <a:p>
             <a:fld id="{975CA606-A290-AA49-BB03-E46655C203C3}" type="datetimeFigureOut">
               <a:rPr lang="en-US" smtClean="0"/>
-              <a:t>3/19/17</a:t>
+              <a:t>4/3/17</a:t>
             </a:fld>
             <a:endParaRPr lang="en-US"/>
           </a:p>
@@ -2561,7 +2567,7 @@
           <a:p>
             <a:fld id="{975CA606-A290-AA49-BB03-E46655C203C3}" type="datetimeFigureOut">
               <a:rPr lang="en-US" smtClean="0"/>
-              <a:t>3/19/17</a:t>
+              <a:t>4/3/17</a:t>
             </a:fld>
             <a:endParaRPr lang="en-US"/>
           </a:p>
@@ -4556,6 +4562,502 @@
 </p:sld>
 </file>
 
+<file path=ppt/slides/slide4.xml><?xml version="1.0" encoding="utf-8"?>
+<p:sld xmlns:a="http://schemas.openxmlformats.org/drawingml/2006/main" xmlns:r="http://schemas.openxmlformats.org/officeDocument/2006/relationships" xmlns:p="http://schemas.openxmlformats.org/presentationml/2006/main">
+  <p:cSld>
+    <p:spTree>
+      <p:nvGrpSpPr>
+        <p:cNvPr id="1" name=""/>
+        <p:cNvGrpSpPr/>
+        <p:nvPr/>
+      </p:nvGrpSpPr>
+      <p:grpSpPr>
+        <a:xfrm>
+          <a:off x="0" y="0"/>
+          <a:ext cx="0" cy="0"/>
+          <a:chOff x="0" y="0"/>
+          <a:chExt cx="0" cy="0"/>
+        </a:xfrm>
+      </p:grpSpPr>
+      <p:pic>
+        <p:nvPicPr>
+          <p:cNvPr id="4" name="Picture 3"/>
+          <p:cNvPicPr>
+            <a:picLocks noChangeAspect="1"/>
+          </p:cNvPicPr>
+          <p:nvPr/>
+        </p:nvPicPr>
+        <p:blipFill>
+          <a:blip r:embed="rId2" cstate="print">
+            <a:extLst>
+              <a:ext uri="{28A0092B-C50C-407E-A947-70E740481C1C}">
+                <a14:useLocalDpi xmlns:a14="http://schemas.microsoft.com/office/drawing/2010/main" val="0"/>
+              </a:ext>
+            </a:extLst>
+          </a:blip>
+          <a:stretch>
+            <a:fillRect/>
+          </a:stretch>
+        </p:blipFill>
+        <p:spPr>
+          <a:xfrm>
+            <a:off x="1940188" y="2997153"/>
+            <a:ext cx="1352361" cy="1352361"/>
+          </a:xfrm>
+          <a:prstGeom prst="rect">
+            <a:avLst/>
+          </a:prstGeom>
+        </p:spPr>
+      </p:pic>
+      <p:pic>
+        <p:nvPicPr>
+          <p:cNvPr id="5" name="Picture 4" descr="Access Control.png"/>
+          <p:cNvPicPr>
+            <a:picLocks noChangeAspect="1"/>
+          </p:cNvPicPr>
+          <p:nvPr/>
+        </p:nvPicPr>
+        <p:blipFill>
+          <a:blip r:embed="rId3">
+            <a:extLst>
+              <a:ext uri="{BEBA8EAE-BF5A-486C-A8C5-ECC9F3942E4B}">
+                <a14:imgProps xmlns:a14="http://schemas.microsoft.com/office/drawing/2010/main">
+                  <a14:imgLayer r:embed="rId4">
+                    <a14:imgEffect>
+                      <a14:colorTemperature colorTemp="11200"/>
+                    </a14:imgEffect>
+                    <a14:imgEffect>
+                      <a14:saturation sat="0"/>
+                    </a14:imgEffect>
+                  </a14:imgLayer>
+                </a14:imgProps>
+              </a:ext>
+              <a:ext uri="{28A0092B-C50C-407E-A947-70E740481C1C}">
+                <a14:useLocalDpi xmlns:a14="http://schemas.microsoft.com/office/drawing/2010/main" val="0"/>
+              </a:ext>
+            </a:extLst>
+          </a:blip>
+          <a:stretch>
+            <a:fillRect/>
+          </a:stretch>
+        </p:blipFill>
+        <p:spPr>
+          <a:xfrm>
+            <a:off x="5117890" y="2973414"/>
+            <a:ext cx="1399837" cy="1399837"/>
+          </a:xfrm>
+          <a:prstGeom prst="rect">
+            <a:avLst/>
+          </a:prstGeom>
+        </p:spPr>
+      </p:pic>
+      <p:sp>
+        <p:nvSpPr>
+          <p:cNvPr id="6" name="TextBox 5"/>
+          <p:cNvSpPr txBox="1"/>
+          <p:nvPr/>
+        </p:nvSpPr>
+        <p:spPr>
+          <a:xfrm>
+            <a:off x="2166078" y="4631960"/>
+            <a:ext cx="827021" cy="369332"/>
+          </a:xfrm>
+          <a:prstGeom prst="rect">
+            <a:avLst/>
+          </a:prstGeom>
+          <a:noFill/>
+        </p:spPr>
+        <p:txBody>
+          <a:bodyPr wrap="none" rtlCol="0">
+            <a:spAutoFit/>
+          </a:bodyPr>
+          <a:lstStyle/>
+          <a:p>
+            <a:r>
+              <a:rPr lang="en-US" b="1" dirty="0" smtClean="0"/>
+              <a:t>Clients</a:t>
+            </a:r>
+            <a:endParaRPr lang="en-US" b="1" dirty="0"/>
+          </a:p>
+        </p:txBody>
+      </p:sp>
+      <p:sp>
+        <p:nvSpPr>
+          <p:cNvPr id="7" name="TextBox 6"/>
+          <p:cNvSpPr txBox="1"/>
+          <p:nvPr/>
+        </p:nvSpPr>
+        <p:spPr>
+          <a:xfrm>
+            <a:off x="5211167" y="4493460"/>
+            <a:ext cx="1213281" cy="646331"/>
+          </a:xfrm>
+          <a:prstGeom prst="rect">
+            <a:avLst/>
+          </a:prstGeom>
+          <a:noFill/>
+        </p:spPr>
+        <p:txBody>
+          <a:bodyPr wrap="none" rtlCol="0">
+            <a:spAutoFit/>
+          </a:bodyPr>
+          <a:lstStyle/>
+          <a:p>
+            <a:pPr algn="ctr"/>
+            <a:r>
+              <a:rPr lang="en-US" b="1" dirty="0" smtClean="0"/>
+              <a:t>Federation</a:t>
+            </a:r>
+          </a:p>
+          <a:p>
+            <a:pPr algn="ctr"/>
+            <a:r>
+              <a:rPr lang="en-US" b="1" dirty="0" smtClean="0"/>
+              <a:t>Gateway</a:t>
+            </a:r>
+            <a:endParaRPr lang="en-US" b="1" dirty="0"/>
+          </a:p>
+        </p:txBody>
+      </p:sp>
+      <p:pic>
+        <p:nvPicPr>
+          <p:cNvPr id="8" name="Picture 7" descr="Access Control.png"/>
+          <p:cNvPicPr>
+            <a:picLocks noChangeAspect="1"/>
+          </p:cNvPicPr>
+          <p:nvPr/>
+        </p:nvPicPr>
+        <p:blipFill>
+          <a:blip r:embed="rId3">
+            <a:extLst>
+              <a:ext uri="{BEBA8EAE-BF5A-486C-A8C5-ECC9F3942E4B}">
+                <a14:imgProps xmlns:a14="http://schemas.microsoft.com/office/drawing/2010/main">
+                  <a14:imgLayer r:embed="rId4">
+                    <a14:imgEffect>
+                      <a14:colorTemperature colorTemp="11200"/>
+                    </a14:imgEffect>
+                    <a14:imgEffect>
+                      <a14:saturation sat="0"/>
+                    </a14:imgEffect>
+                  </a14:imgLayer>
+                </a14:imgProps>
+              </a:ext>
+              <a:ext uri="{28A0092B-C50C-407E-A947-70E740481C1C}">
+                <a14:useLocalDpi xmlns:a14="http://schemas.microsoft.com/office/drawing/2010/main" val="0"/>
+              </a:ext>
+            </a:extLst>
+          </a:blip>
+          <a:stretch>
+            <a:fillRect/>
+          </a:stretch>
+        </p:blipFill>
+        <p:spPr>
+          <a:xfrm>
+            <a:off x="8238731" y="2399405"/>
+            <a:ext cx="777355" cy="777355"/>
+          </a:xfrm>
+          <a:prstGeom prst="rect">
+            <a:avLst/>
+          </a:prstGeom>
+        </p:spPr>
+      </p:pic>
+      <p:pic>
+        <p:nvPicPr>
+          <p:cNvPr id="9" name="Picture 8" descr="Access Control.png"/>
+          <p:cNvPicPr>
+            <a:picLocks noChangeAspect="1"/>
+          </p:cNvPicPr>
+          <p:nvPr/>
+        </p:nvPicPr>
+        <p:blipFill>
+          <a:blip r:embed="rId3">
+            <a:extLst>
+              <a:ext uri="{BEBA8EAE-BF5A-486C-A8C5-ECC9F3942E4B}">
+                <a14:imgProps xmlns:a14="http://schemas.microsoft.com/office/drawing/2010/main">
+                  <a14:imgLayer r:embed="rId4">
+                    <a14:imgEffect>
+                      <a14:colorTemperature colorTemp="11200"/>
+                    </a14:imgEffect>
+                    <a14:imgEffect>
+                      <a14:saturation sat="0"/>
+                    </a14:imgEffect>
+                  </a14:imgLayer>
+                </a14:imgProps>
+              </a:ext>
+              <a:ext uri="{28A0092B-C50C-407E-A947-70E740481C1C}">
+                <a14:useLocalDpi xmlns:a14="http://schemas.microsoft.com/office/drawing/2010/main" val="0"/>
+              </a:ext>
+            </a:extLst>
+          </a:blip>
+          <a:stretch>
+            <a:fillRect/>
+          </a:stretch>
+        </p:blipFill>
+        <p:spPr>
+          <a:xfrm>
+            <a:off x="8238731" y="3311671"/>
+            <a:ext cx="777355" cy="777355"/>
+          </a:xfrm>
+          <a:prstGeom prst="rect">
+            <a:avLst/>
+          </a:prstGeom>
+        </p:spPr>
+      </p:pic>
+      <p:pic>
+        <p:nvPicPr>
+          <p:cNvPr id="10" name="Picture 9" descr="Access Control.png"/>
+          <p:cNvPicPr>
+            <a:picLocks noChangeAspect="1"/>
+          </p:cNvPicPr>
+          <p:nvPr/>
+        </p:nvPicPr>
+        <p:blipFill>
+          <a:blip r:embed="rId3">
+            <a:extLst>
+              <a:ext uri="{BEBA8EAE-BF5A-486C-A8C5-ECC9F3942E4B}">
+                <a14:imgProps xmlns:a14="http://schemas.microsoft.com/office/drawing/2010/main">
+                  <a14:imgLayer r:embed="rId4">
+                    <a14:imgEffect>
+                      <a14:colorTemperature colorTemp="11200"/>
+                    </a14:imgEffect>
+                    <a14:imgEffect>
+                      <a14:saturation sat="0"/>
+                    </a14:imgEffect>
+                  </a14:imgLayer>
+                </a14:imgProps>
+              </a:ext>
+              <a:ext uri="{28A0092B-C50C-407E-A947-70E740481C1C}">
+                <a14:useLocalDpi xmlns:a14="http://schemas.microsoft.com/office/drawing/2010/main" val="0"/>
+              </a:ext>
+            </a:extLst>
+          </a:blip>
+          <a:stretch>
+            <a:fillRect/>
+          </a:stretch>
+        </p:blipFill>
+        <p:spPr>
+          <a:xfrm>
+            <a:off x="8238731" y="4223937"/>
+            <a:ext cx="777355" cy="777355"/>
+          </a:xfrm>
+          <a:prstGeom prst="rect">
+            <a:avLst/>
+          </a:prstGeom>
+        </p:spPr>
+      </p:pic>
+      <p:sp>
+        <p:nvSpPr>
+          <p:cNvPr id="11" name="TextBox 10"/>
+          <p:cNvSpPr txBox="1"/>
+          <p:nvPr/>
+        </p:nvSpPr>
+        <p:spPr>
+          <a:xfrm>
+            <a:off x="9379147" y="3105736"/>
+            <a:ext cx="1937903" cy="1200329"/>
+          </a:xfrm>
+          <a:prstGeom prst="rect">
+            <a:avLst/>
+          </a:prstGeom>
+          <a:noFill/>
+        </p:spPr>
+        <p:txBody>
+          <a:bodyPr wrap="none" rtlCol="0">
+            <a:spAutoFit/>
+          </a:bodyPr>
+          <a:lstStyle/>
+          <a:p>
+            <a:r>
+              <a:rPr lang="en-US" b="1" dirty="0" smtClean="0"/>
+              <a:t>- Active Directory</a:t>
+            </a:r>
+          </a:p>
+          <a:p>
+            <a:r>
+              <a:rPr lang="en-US" b="1" dirty="0" smtClean="0"/>
+              <a:t>- Azure AD/B2C</a:t>
+            </a:r>
+          </a:p>
+          <a:p>
+            <a:r>
+              <a:rPr lang="en-US" b="1" dirty="0" smtClean="0"/>
+              <a:t>- Business Partner</a:t>
+            </a:r>
+          </a:p>
+          <a:p>
+            <a:r>
+              <a:rPr lang="en-US" b="1" dirty="0" smtClean="0"/>
+              <a:t>- Social Identities..</a:t>
+            </a:r>
+            <a:endParaRPr lang="en-US" b="1" dirty="0"/>
+          </a:p>
+        </p:txBody>
+      </p:sp>
+      <p:cxnSp>
+        <p:nvCxnSpPr>
+          <p:cNvPr id="13" name="Straight Arrow Connector 12"/>
+          <p:cNvCxnSpPr/>
+          <p:nvPr/>
+        </p:nvCxnSpPr>
+        <p:spPr>
+          <a:xfrm flipV="1">
+            <a:off x="6735105" y="2891710"/>
+            <a:ext cx="1364105" cy="781622"/>
+          </a:xfrm>
+          <a:prstGeom prst="straightConnector1">
+            <a:avLst/>
+          </a:prstGeom>
+          <a:ln w="25400">
+            <a:solidFill>
+              <a:schemeClr val="bg1">
+                <a:lumMod val="50000"/>
+              </a:schemeClr>
+            </a:solidFill>
+            <a:tailEnd type="triangle"/>
+          </a:ln>
+        </p:spPr>
+        <p:style>
+          <a:lnRef idx="1">
+            <a:schemeClr val="accent1"/>
+          </a:lnRef>
+          <a:fillRef idx="0">
+            <a:schemeClr val="accent1"/>
+          </a:fillRef>
+          <a:effectRef idx="0">
+            <a:schemeClr val="accent1"/>
+          </a:effectRef>
+          <a:fontRef idx="minor">
+            <a:schemeClr val="tx1"/>
+          </a:fontRef>
+        </p:style>
+      </p:cxnSp>
+      <p:cxnSp>
+        <p:nvCxnSpPr>
+          <p:cNvPr id="14" name="Straight Arrow Connector 13"/>
+          <p:cNvCxnSpPr/>
+          <p:nvPr/>
+        </p:nvCxnSpPr>
+        <p:spPr>
+          <a:xfrm flipV="1">
+            <a:off x="6735105" y="3673332"/>
+            <a:ext cx="1433865" cy="87715"/>
+          </a:xfrm>
+          <a:prstGeom prst="straightConnector1">
+            <a:avLst/>
+          </a:prstGeom>
+          <a:ln w="25400">
+            <a:solidFill>
+              <a:schemeClr val="bg1">
+                <a:lumMod val="50000"/>
+              </a:schemeClr>
+            </a:solidFill>
+            <a:tailEnd type="triangle"/>
+          </a:ln>
+        </p:spPr>
+        <p:style>
+          <a:lnRef idx="1">
+            <a:schemeClr val="accent1"/>
+          </a:lnRef>
+          <a:fillRef idx="0">
+            <a:schemeClr val="accent1"/>
+          </a:fillRef>
+          <a:effectRef idx="0">
+            <a:schemeClr val="accent1"/>
+          </a:effectRef>
+          <a:fontRef idx="minor">
+            <a:schemeClr val="tx1"/>
+          </a:fontRef>
+        </p:style>
+      </p:cxnSp>
+      <p:cxnSp>
+        <p:nvCxnSpPr>
+          <p:cNvPr id="17" name="Straight Arrow Connector 16"/>
+          <p:cNvCxnSpPr/>
+          <p:nvPr/>
+        </p:nvCxnSpPr>
+        <p:spPr>
+          <a:xfrm>
+            <a:off x="6764111" y="3897745"/>
+            <a:ext cx="1335099" cy="734215"/>
+          </a:xfrm>
+          <a:prstGeom prst="straightConnector1">
+            <a:avLst/>
+          </a:prstGeom>
+          <a:ln w="25400">
+            <a:solidFill>
+              <a:schemeClr val="bg1">
+                <a:lumMod val="50000"/>
+              </a:schemeClr>
+            </a:solidFill>
+            <a:tailEnd type="triangle"/>
+          </a:ln>
+        </p:spPr>
+        <p:style>
+          <a:lnRef idx="1">
+            <a:schemeClr val="accent1"/>
+          </a:lnRef>
+          <a:fillRef idx="0">
+            <a:schemeClr val="accent1"/>
+          </a:fillRef>
+          <a:effectRef idx="0">
+            <a:schemeClr val="accent1"/>
+          </a:effectRef>
+          <a:fontRef idx="minor">
+            <a:schemeClr val="tx1"/>
+          </a:fontRef>
+        </p:style>
+      </p:cxnSp>
+      <p:cxnSp>
+        <p:nvCxnSpPr>
+          <p:cNvPr id="24" name="Straight Arrow Connector 23"/>
+          <p:cNvCxnSpPr/>
+          <p:nvPr/>
+        </p:nvCxnSpPr>
+        <p:spPr>
+          <a:xfrm flipV="1">
+            <a:off x="3461076" y="3673332"/>
+            <a:ext cx="1439436" cy="1"/>
+          </a:xfrm>
+          <a:prstGeom prst="straightConnector1">
+            <a:avLst/>
+          </a:prstGeom>
+          <a:ln w="25400">
+            <a:solidFill>
+              <a:schemeClr val="bg1">
+                <a:lumMod val="50000"/>
+              </a:schemeClr>
+            </a:solidFill>
+            <a:tailEnd type="triangle"/>
+          </a:ln>
+        </p:spPr>
+        <p:style>
+          <a:lnRef idx="1">
+            <a:schemeClr val="accent1"/>
+          </a:lnRef>
+          <a:fillRef idx="0">
+            <a:schemeClr val="accent1"/>
+          </a:fillRef>
+          <a:effectRef idx="0">
+            <a:schemeClr val="accent1"/>
+          </a:effectRef>
+          <a:fontRef idx="minor">
+            <a:schemeClr val="tx1"/>
+          </a:fontRef>
+        </p:style>
+      </p:cxnSp>
+    </p:spTree>
+    <p:extLst>
+      <p:ext uri="{BB962C8B-B14F-4D97-AF65-F5344CB8AC3E}">
+        <p14:creationId xmlns:p14="http://schemas.microsoft.com/office/powerpoint/2010/main" val="1905554598"/>
+      </p:ext>
+    </p:extLst>
+  </p:cSld>
+  <p:clrMapOvr>
+    <a:masterClrMapping/>
+  </p:clrMapOvr>
+</p:sld>
+</file>
+
 <file path=ppt/theme/theme1.xml><?xml version="1.0" encoding="utf-8"?>
 <a:theme xmlns:a="http://schemas.openxmlformats.org/drawingml/2006/main" name="Office Theme">
   <a:themeElements>

</xml_diff>